<commit_message>
New figure (experimental design)
</commit_message>
<xml_diff>
--- a/Project Presentation 09-10-2020.pptx
+++ b/Project Presentation 09-10-2020.pptx
@@ -190,16 +190,32 @@
 </p:cmAuthorLst>
 </file>
 
-<file path=ppt/revisionInfo.xml><?xml version="1.0" encoding="utf-8"?>
-<p1510:revInfo xmlns:a="http://schemas.openxmlformats.org/drawingml/2006/main" xmlns:r="http://schemas.openxmlformats.org/officeDocument/2006/relationships" xmlns:p1510="http://schemas.microsoft.com/office/powerpoint/2015/10/main">
-  <p1510:revLst>
-    <p1510:client id="{A6C9BCA9-C059-454B-820F-B67BAA831FB6}" v="41" dt="2020-10-21T06:12:05.145"/>
-  </p1510:revLst>
-</p1510:revInfo>
-</file>
-
 <file path=ppt/changesInfos/changesInfo1.xml><?xml version="1.0" encoding="utf-8"?>
 <pc:chgInfo xmlns:a="http://schemas.openxmlformats.org/drawingml/2006/main" xmlns:r="http://schemas.openxmlformats.org/officeDocument/2006/relationships" xmlns:ac="http://schemas.microsoft.com/office/drawing/2013/main/command" xmlns:pc="http://schemas.microsoft.com/office/powerpoint/2013/main/command">
+  <pc:docChgLst>
+    <pc:chgData name="benjamin Skjold" userId="c95198f139ad621b" providerId="LiveId" clId="{3FB25B57-ED0C-4654-9037-0C4A843410C0}"/>
+    <pc:docChg chg="undo modSld">
+      <pc:chgData name="benjamin Skjold" userId="c95198f139ad621b" providerId="LiveId" clId="{3FB25B57-ED0C-4654-9037-0C4A843410C0}" dt="2020-11-04T12:02:43.095" v="2" actId="1076"/>
+      <pc:docMkLst>
+        <pc:docMk/>
+      </pc:docMkLst>
+      <pc:sldChg chg="modSp">
+        <pc:chgData name="benjamin Skjold" userId="c95198f139ad621b" providerId="LiveId" clId="{3FB25B57-ED0C-4654-9037-0C4A843410C0}" dt="2020-11-04T12:02:43.095" v="2" actId="1076"/>
+        <pc:sldMkLst>
+          <pc:docMk/>
+          <pc:sldMk cId="1598961872" sldId="308"/>
+        </pc:sldMkLst>
+        <pc:spChg chg="mod">
+          <ac:chgData name="benjamin Skjold" userId="c95198f139ad621b" providerId="LiveId" clId="{3FB25B57-ED0C-4654-9037-0C4A843410C0}" dt="2020-11-04T12:02:43.095" v="2" actId="1076"/>
+          <ac:spMkLst>
+            <pc:docMk/>
+            <pc:sldMk cId="1598961872" sldId="308"/>
+            <ac:spMk id="10" creationId="{7320F961-30EE-4B8B-A5CB-9E787CC66934}"/>
+          </ac:spMkLst>
+        </pc:spChg>
+      </pc:sldChg>
+    </pc:docChg>
+  </pc:docChgLst>
   <pc:docChgLst>
     <pc:chgData name="benjamin Skjold" userId="c95198f139ad621b" providerId="LiveId" clId="{A6C9BCA9-C059-454B-820F-B67BAA831FB6}"/>
     <pc:docChg chg="custSel mod addSld delSld modSld">
@@ -1118,7 +1134,7 @@
               <a:pPr>
                 <a:defRPr/>
               </a:pPr>
-              <a:t>10/21/2020</a:t>
+              <a:t>11/4/2020</a:t>
             </a:fld>
             <a:endParaRPr lang="en-US"/>
           </a:p>
@@ -1713,7 +1729,7 @@
             </a:pPr>
             <a:fld id="{86E34AD9-2CBC-4AEF-9270-53CFB936E708}" type="datetime1">
               <a:rPr lang="en-US" smtClean="0"/>
-              <a:t>10/21/2020</a:t>
+              <a:t>11/4/2020</a:t>
             </a:fld>
             <a:endParaRPr lang="en-US"/>
           </a:p>
@@ -1984,7 +2000,7 @@
             </a:pPr>
             <a:fld id="{3BD5145F-2A18-4C5B-B396-AB55D993CFFA}" type="datetime1">
               <a:rPr lang="en-US" smtClean="0"/>
-              <a:t>10/21/2020</a:t>
+              <a:t>11/4/2020</a:t>
             </a:fld>
             <a:endParaRPr lang="en-US"/>
           </a:p>
@@ -2183,7 +2199,7 @@
             </a:pPr>
             <a:fld id="{9C0B46F0-D909-453B-920C-6C01731147C8}" type="datetime1">
               <a:rPr lang="en-US" smtClean="0"/>
-              <a:t>10/21/2020</a:t>
+              <a:t>11/4/2020</a:t>
             </a:fld>
             <a:endParaRPr lang="en-US"/>
           </a:p>
@@ -2543,7 +2559,7 @@
             </a:pPr>
             <a:fld id="{D74287AB-4900-41D9-891B-3C16BA50C872}" type="datetime1">
               <a:rPr lang="en-US" smtClean="0"/>
-              <a:t>10/21/2020</a:t>
+              <a:t>11/4/2020</a:t>
             </a:fld>
             <a:endParaRPr lang="en-US"/>
           </a:p>
@@ -2889,7 +2905,7 @@
             </a:pPr>
             <a:fld id="{E33FD8B2-4164-4883-BE56-9C36A5182573}" type="datetime1">
               <a:rPr lang="en-US" smtClean="0"/>
-              <a:t>10/21/2020</a:t>
+              <a:t>11/4/2020</a:t>
             </a:fld>
             <a:endParaRPr lang="en-US"/>
           </a:p>
@@ -3312,7 +3328,7 @@
             </a:pPr>
             <a:fld id="{10F04FF5-3DAC-4ED1-9968-175F296C636E}" type="datetime1">
               <a:rPr lang="en-US" smtClean="0"/>
-              <a:t>10/21/2020</a:t>
+              <a:t>11/4/2020</a:t>
             </a:fld>
             <a:endParaRPr lang="en-US"/>
           </a:p>
@@ -3865,7 +3881,7 @@
             </a:pPr>
             <a:fld id="{FFEFAB89-8887-461C-BFBA-5331ABB9C983}" type="datetime1">
               <a:rPr lang="en-US" smtClean="0"/>
-              <a:t>10/21/2020</a:t>
+              <a:t>11/4/2020</a:t>
             </a:fld>
             <a:endParaRPr lang="en-US"/>
           </a:p>
@@ -4083,7 +4099,7 @@
             </a:pPr>
             <a:fld id="{62100CA6-AB09-45EB-A60C-DD3E04BDAF06}" type="datetime1">
               <a:rPr lang="en-US" smtClean="0"/>
-              <a:t>10/21/2020</a:t>
+              <a:t>11/4/2020</a:t>
             </a:fld>
             <a:endParaRPr lang="en-US"/>
           </a:p>
@@ -4221,7 +4237,7 @@
             </a:pPr>
             <a:fld id="{078499C3-882C-49E4-A0C1-2B049F166C74}" type="datetime1">
               <a:rPr lang="en-US" smtClean="0"/>
-              <a:t>10/21/2020</a:t>
+              <a:t>11/4/2020</a:t>
             </a:fld>
             <a:endParaRPr lang="en-US"/>
           </a:p>
@@ -4517,7 +4533,7 @@
             </a:pPr>
             <a:fld id="{52410CD0-8C0D-4DE9-980F-F7F6767902AE}" type="datetime1">
               <a:rPr lang="en-US" smtClean="0"/>
-              <a:t>10/21/2020</a:t>
+              <a:t>11/4/2020</a:t>
             </a:fld>
             <a:endParaRPr lang="en-US"/>
           </a:p>
@@ -4792,7 +4808,7 @@
             </a:pPr>
             <a:fld id="{CA7A4F5A-631A-4573-AFDF-D75CF3A4422B}" type="datetime1">
               <a:rPr lang="en-US" smtClean="0"/>
-              <a:t>10/21/2020</a:t>
+              <a:t>11/4/2020</a:t>
             </a:fld>
             <a:endParaRPr lang="en-US"/>
           </a:p>
@@ -5041,7 +5057,7 @@
             </a:pPr>
             <a:fld id="{9AD94DFC-7360-417D-BCA3-1AD5DBAD9137}" type="datetime1">
               <a:rPr lang="en-US" smtClean="0"/>
-              <a:t>10/21/2020</a:t>
+              <a:t>11/4/2020</a:t>
             </a:fld>
             <a:endParaRPr lang="en-US"/>
           </a:p>
@@ -11683,8 +11699,8 @@
           </a:p>
         </p:txBody>
       </p:sp>
-      <mc:AlternateContent xmlns:mc="http://schemas.openxmlformats.org/markup-compatibility/2006">
-        <mc:Choice xmlns:a14="http://schemas.microsoft.com/office/drawing/2010/main" Requires="a14">
+      <mc:AlternateContent xmlns:mc="http://schemas.openxmlformats.org/markup-compatibility/2006" xmlns:a14="http://schemas.microsoft.com/office/drawing/2010/main">
+        <mc:Choice Requires="a14">
           <p:sp>
             <p:nvSpPr>
               <p:cNvPr id="2" name="Tekstfelt 1">
@@ -11713,6 +11729,7 @@
               </a:bodyPr>
               <a:lstStyle/>
               <a:p>
+                <a:pPr/>
                 <a14:m>
                   <m:oMathPara xmlns:m="http://schemas.openxmlformats.org/officeDocument/2006/math">
                     <m:oMathParaPr>
@@ -11808,7 +11825,7 @@
             </p:txBody>
           </p:sp>
         </mc:Choice>
-        <mc:Fallback>
+        <mc:Fallback xmlns="">
           <p:sp>
             <p:nvSpPr>
               <p:cNvPr id="2" name="Tekstfelt 1">
@@ -13168,7 +13185,7 @@
         </p:nvSpPr>
         <p:spPr>
           <a:xfrm>
-            <a:off x="457200" y="1363033"/>
+            <a:off x="547943" y="389093"/>
             <a:ext cx="7472856" cy="1200329"/>
           </a:xfrm>
           <a:prstGeom prst="rect">

</xml_diff>